<commit_message>
update to main page
</commit_message>
<xml_diff>
--- a/images/Presentation1.pptx
+++ b/images/Presentation1.pptx
@@ -8,6 +8,7 @@
     <p:sldId id="256" r:id="rId2"/>
     <p:sldId id="257" r:id="rId3"/>
     <p:sldId id="259" r:id="rId4"/>
+    <p:sldId id="260" r:id="rId5"/>
   </p:sldIdLst>
   <p:sldSz cx="12192000" cy="6858000"/>
   <p:notesSz cx="6858000" cy="9144000"/>
@@ -243,7 +244,7 @@
           <a:p>
             <a:fld id="{3F2435BA-A7F3-4F65-B06F-64A5EAF7603B}" type="datetimeFigureOut">
               <a:rPr lang="en-US" smtClean="0"/>
-              <a:t>12/10/2020</a:t>
+              <a:t>5/27/2021</a:t>
             </a:fld>
             <a:endParaRPr lang="en-US"/>
           </a:p>
@@ -411,7 +412,7 @@
           <a:p>
             <a:fld id="{3F2435BA-A7F3-4F65-B06F-64A5EAF7603B}" type="datetimeFigureOut">
               <a:rPr lang="en-US" smtClean="0"/>
-              <a:t>12/10/2020</a:t>
+              <a:t>5/27/2021</a:t>
             </a:fld>
             <a:endParaRPr lang="en-US"/>
           </a:p>
@@ -589,7 +590,7 @@
           <a:p>
             <a:fld id="{3F2435BA-A7F3-4F65-B06F-64A5EAF7603B}" type="datetimeFigureOut">
               <a:rPr lang="en-US" smtClean="0"/>
-              <a:t>12/10/2020</a:t>
+              <a:t>5/27/2021</a:t>
             </a:fld>
             <a:endParaRPr lang="en-US"/>
           </a:p>
@@ -757,7 +758,7 @@
           <a:p>
             <a:fld id="{3F2435BA-A7F3-4F65-B06F-64A5EAF7603B}" type="datetimeFigureOut">
               <a:rPr lang="en-US" smtClean="0"/>
-              <a:t>12/10/2020</a:t>
+              <a:t>5/27/2021</a:t>
             </a:fld>
             <a:endParaRPr lang="en-US"/>
           </a:p>
@@ -1002,7 +1003,7 @@
           <a:p>
             <a:fld id="{3F2435BA-A7F3-4F65-B06F-64A5EAF7603B}" type="datetimeFigureOut">
               <a:rPr lang="en-US" smtClean="0"/>
-              <a:t>12/10/2020</a:t>
+              <a:t>5/27/2021</a:t>
             </a:fld>
             <a:endParaRPr lang="en-US"/>
           </a:p>
@@ -1231,7 +1232,7 @@
           <a:p>
             <a:fld id="{3F2435BA-A7F3-4F65-B06F-64A5EAF7603B}" type="datetimeFigureOut">
               <a:rPr lang="en-US" smtClean="0"/>
-              <a:t>12/10/2020</a:t>
+              <a:t>5/27/2021</a:t>
             </a:fld>
             <a:endParaRPr lang="en-US"/>
           </a:p>
@@ -1595,7 +1596,7 @@
           <a:p>
             <a:fld id="{3F2435BA-A7F3-4F65-B06F-64A5EAF7603B}" type="datetimeFigureOut">
               <a:rPr lang="en-US" smtClean="0"/>
-              <a:t>12/10/2020</a:t>
+              <a:t>5/27/2021</a:t>
             </a:fld>
             <a:endParaRPr lang="en-US"/>
           </a:p>
@@ -1712,7 +1713,7 @@
           <a:p>
             <a:fld id="{3F2435BA-A7F3-4F65-B06F-64A5EAF7603B}" type="datetimeFigureOut">
               <a:rPr lang="en-US" smtClean="0"/>
-              <a:t>12/10/2020</a:t>
+              <a:t>5/27/2021</a:t>
             </a:fld>
             <a:endParaRPr lang="en-US"/>
           </a:p>
@@ -1807,7 +1808,7 @@
           <a:p>
             <a:fld id="{3F2435BA-A7F3-4F65-B06F-64A5EAF7603B}" type="datetimeFigureOut">
               <a:rPr lang="en-US" smtClean="0"/>
-              <a:t>12/10/2020</a:t>
+              <a:t>5/27/2021</a:t>
             </a:fld>
             <a:endParaRPr lang="en-US"/>
           </a:p>
@@ -2082,7 +2083,7 @@
           <a:p>
             <a:fld id="{3F2435BA-A7F3-4F65-B06F-64A5EAF7603B}" type="datetimeFigureOut">
               <a:rPr lang="en-US" smtClean="0"/>
-              <a:t>12/10/2020</a:t>
+              <a:t>5/27/2021</a:t>
             </a:fld>
             <a:endParaRPr lang="en-US"/>
           </a:p>
@@ -2334,7 +2335,7 @@
           <a:p>
             <a:fld id="{3F2435BA-A7F3-4F65-B06F-64A5EAF7603B}" type="datetimeFigureOut">
               <a:rPr lang="en-US" smtClean="0"/>
-              <a:t>12/10/2020</a:t>
+              <a:t>5/27/2021</a:t>
             </a:fld>
             <a:endParaRPr lang="en-US"/>
           </a:p>
@@ -2545,7 +2546,7 @@
           <a:p>
             <a:fld id="{3F2435BA-A7F3-4F65-B06F-64A5EAF7603B}" type="datetimeFigureOut">
               <a:rPr lang="en-US" smtClean="0"/>
-              <a:t>12/10/2020</a:t>
+              <a:t>5/27/2021</a:t>
             </a:fld>
             <a:endParaRPr lang="en-US"/>
           </a:p>
@@ -3189,7 +3190,7 @@
         </p:nvSpPr>
         <p:spPr>
           <a:xfrm>
-            <a:off x="361026" y="1377387"/>
+            <a:off x="362377" y="1375661"/>
             <a:ext cx="5983893" cy="5157040"/>
           </a:xfrm>
           <a:prstGeom prst="rect">
@@ -4715,6 +4716,1648 @@
     <p:extLst>
       <p:ext uri="{BB962C8B-B14F-4D97-AF65-F5344CB8AC3E}">
         <p14:creationId xmlns:p14="http://schemas.microsoft.com/office/powerpoint/2010/main" val="1238301277"/>
+      </p:ext>
+    </p:extLst>
+  </p:cSld>
+  <p:clrMapOvr>
+    <a:masterClrMapping/>
+  </p:clrMapOvr>
+</p:sld>
+</file>
+
+<file path=ppt/slides/slide4.xml><?xml version="1.0" encoding="utf-8"?>
+<p:sld xmlns:a="http://schemas.openxmlformats.org/drawingml/2006/main" xmlns:r="http://schemas.openxmlformats.org/officeDocument/2006/relationships" xmlns:p="http://schemas.openxmlformats.org/presentationml/2006/main">
+  <p:cSld>
+    <p:spTree>
+      <p:nvGrpSpPr>
+        <p:cNvPr id="1" name=""/>
+        <p:cNvGrpSpPr/>
+        <p:nvPr/>
+      </p:nvGrpSpPr>
+      <p:grpSpPr>
+        <a:xfrm>
+          <a:off x="0" y="0"/>
+          <a:ext cx="0" cy="0"/>
+          <a:chOff x="0" y="0"/>
+          <a:chExt cx="0" cy="0"/>
+        </a:xfrm>
+      </p:grpSpPr>
+      <p:sp>
+        <p:nvSpPr>
+          <p:cNvPr id="37" name="Rectangle 36">
+            <a:extLst>
+              <a:ext uri="{FF2B5EF4-FFF2-40B4-BE49-F238E27FC236}">
+                <a16:creationId xmlns:a16="http://schemas.microsoft.com/office/drawing/2014/main" id="{159E137C-8BD4-4E09-AE99-C316CECE4120}"/>
+              </a:ext>
+            </a:extLst>
+          </p:cNvPr>
+          <p:cNvSpPr/>
+          <p:nvPr/>
+        </p:nvSpPr>
+        <p:spPr>
+          <a:xfrm>
+            <a:off x="-4954398" y="1375661"/>
+            <a:ext cx="16459200" cy="5157040"/>
+          </a:xfrm>
+          <a:prstGeom prst="rect">
+            <a:avLst/>
+          </a:prstGeom>
+          <a:solidFill>
+            <a:schemeClr val="bg1"/>
+          </a:solidFill>
+          <a:ln>
+            <a:noFill/>
+          </a:ln>
+        </p:spPr>
+        <p:style>
+          <a:lnRef idx="2">
+            <a:schemeClr val="accent1">
+              <a:shade val="50000"/>
+            </a:schemeClr>
+          </a:lnRef>
+          <a:fillRef idx="1">
+            <a:schemeClr val="accent1"/>
+          </a:fillRef>
+          <a:effectRef idx="0">
+            <a:schemeClr val="accent1"/>
+          </a:effectRef>
+          <a:fontRef idx="minor">
+            <a:schemeClr val="lt1"/>
+          </a:fontRef>
+        </p:style>
+        <p:txBody>
+          <a:bodyPr rtlCol="0" anchor="ctr"/>
+          <a:lstStyle/>
+          <a:p>
+            <a:pPr algn="ctr"/>
+            <a:r>
+              <a:rPr lang="en-US" dirty="0"/>
+              <a:t>	</a:t>
+            </a:r>
+          </a:p>
+        </p:txBody>
+      </p:sp>
+      <p:sp>
+        <p:nvSpPr>
+          <p:cNvPr id="8" name="Rectangle 7">
+            <a:extLst>
+              <a:ext uri="{FF2B5EF4-FFF2-40B4-BE49-F238E27FC236}">
+                <a16:creationId xmlns:a16="http://schemas.microsoft.com/office/drawing/2014/main" id="{36413D0F-6DC1-4952-9158-A3EA154CD823}"/>
+              </a:ext>
+            </a:extLst>
+          </p:cNvPr>
+          <p:cNvSpPr/>
+          <p:nvPr/>
+        </p:nvSpPr>
+        <p:spPr>
+          <a:xfrm>
+            <a:off x="362377" y="1375661"/>
+            <a:ext cx="5983893" cy="5157040"/>
+          </a:xfrm>
+          <a:prstGeom prst="rect">
+            <a:avLst/>
+          </a:prstGeom>
+          <a:solidFill>
+            <a:srgbClr val="D6E5EC"/>
+          </a:solidFill>
+          <a:ln>
+            <a:noFill/>
+          </a:ln>
+        </p:spPr>
+        <p:style>
+          <a:lnRef idx="2">
+            <a:schemeClr val="accent1">
+              <a:shade val="50000"/>
+            </a:schemeClr>
+          </a:lnRef>
+          <a:fillRef idx="1">
+            <a:schemeClr val="accent1"/>
+          </a:fillRef>
+          <a:effectRef idx="0">
+            <a:schemeClr val="accent1"/>
+          </a:effectRef>
+          <a:fontRef idx="minor">
+            <a:schemeClr val="lt1"/>
+          </a:fontRef>
+        </p:style>
+        <p:txBody>
+          <a:bodyPr rtlCol="0" anchor="ctr"/>
+          <a:lstStyle/>
+          <a:p>
+            <a:pPr algn="ctr"/>
+            <a:r>
+              <a:rPr lang="en-US" dirty="0"/>
+              <a:t>	</a:t>
+            </a:r>
+          </a:p>
+        </p:txBody>
+      </p:sp>
+      <p:cxnSp>
+        <p:nvCxnSpPr>
+          <p:cNvPr id="10" name="Straight Connector 9">
+            <a:extLst>
+              <a:ext uri="{FF2B5EF4-FFF2-40B4-BE49-F238E27FC236}">
+                <a16:creationId xmlns:a16="http://schemas.microsoft.com/office/drawing/2014/main" id="{B4703372-8057-43C3-89B3-B6CBE97C4463}"/>
+              </a:ext>
+            </a:extLst>
+          </p:cNvPr>
+          <p:cNvCxnSpPr/>
+          <p:nvPr/>
+        </p:nvCxnSpPr>
+        <p:spPr>
+          <a:xfrm>
+            <a:off x="613410" y="5264947"/>
+            <a:ext cx="5486400" cy="0"/>
+          </a:xfrm>
+          <a:prstGeom prst="line">
+            <a:avLst/>
+          </a:prstGeom>
+          <a:ln w="38100">
+            <a:solidFill>
+              <a:schemeClr val="bg1"/>
+            </a:solidFill>
+          </a:ln>
+        </p:spPr>
+        <p:style>
+          <a:lnRef idx="1">
+            <a:schemeClr val="accent1"/>
+          </a:lnRef>
+          <a:fillRef idx="0">
+            <a:schemeClr val="accent1"/>
+          </a:fillRef>
+          <a:effectRef idx="0">
+            <a:schemeClr val="accent1"/>
+          </a:effectRef>
+          <a:fontRef idx="minor">
+            <a:schemeClr val="tx1"/>
+          </a:fontRef>
+        </p:style>
+      </p:cxnSp>
+      <p:cxnSp>
+        <p:nvCxnSpPr>
+          <p:cNvPr id="11" name="Straight Connector 10">
+            <a:extLst>
+              <a:ext uri="{FF2B5EF4-FFF2-40B4-BE49-F238E27FC236}">
+                <a16:creationId xmlns:a16="http://schemas.microsoft.com/office/drawing/2014/main" id="{40FE9042-3420-48CA-A188-4F461FC5DAD4}"/>
+              </a:ext>
+            </a:extLst>
+          </p:cNvPr>
+          <p:cNvCxnSpPr/>
+          <p:nvPr/>
+        </p:nvCxnSpPr>
+        <p:spPr>
+          <a:xfrm>
+            <a:off x="623570" y="2516815"/>
+            <a:ext cx="5486400" cy="0"/>
+          </a:xfrm>
+          <a:prstGeom prst="line">
+            <a:avLst/>
+          </a:prstGeom>
+          <a:ln w="38100">
+            <a:solidFill>
+              <a:schemeClr val="bg1"/>
+            </a:solidFill>
+          </a:ln>
+        </p:spPr>
+        <p:style>
+          <a:lnRef idx="1">
+            <a:schemeClr val="accent1"/>
+          </a:lnRef>
+          <a:fillRef idx="0">
+            <a:schemeClr val="accent1"/>
+          </a:fillRef>
+          <a:effectRef idx="0">
+            <a:schemeClr val="accent1"/>
+          </a:effectRef>
+          <a:fontRef idx="minor">
+            <a:schemeClr val="tx1"/>
+          </a:fontRef>
+        </p:style>
+      </p:cxnSp>
+      <p:cxnSp>
+        <p:nvCxnSpPr>
+          <p:cNvPr id="12" name="Straight Connector 11">
+            <a:extLst>
+              <a:ext uri="{FF2B5EF4-FFF2-40B4-BE49-F238E27FC236}">
+                <a16:creationId xmlns:a16="http://schemas.microsoft.com/office/drawing/2014/main" id="{2156C440-9B2F-49FF-AFE0-6FC84AFB8D76}"/>
+              </a:ext>
+            </a:extLst>
+          </p:cNvPr>
+          <p:cNvCxnSpPr/>
+          <p:nvPr/>
+        </p:nvCxnSpPr>
+        <p:spPr>
+          <a:xfrm>
+            <a:off x="613410" y="3437577"/>
+            <a:ext cx="5486400" cy="0"/>
+          </a:xfrm>
+          <a:prstGeom prst="line">
+            <a:avLst/>
+          </a:prstGeom>
+          <a:ln w="38100">
+            <a:solidFill>
+              <a:schemeClr val="bg1"/>
+            </a:solidFill>
+          </a:ln>
+        </p:spPr>
+        <p:style>
+          <a:lnRef idx="1">
+            <a:schemeClr val="accent1"/>
+          </a:lnRef>
+          <a:fillRef idx="0">
+            <a:schemeClr val="accent1"/>
+          </a:fillRef>
+          <a:effectRef idx="0">
+            <a:schemeClr val="accent1"/>
+          </a:effectRef>
+          <a:fontRef idx="minor">
+            <a:schemeClr val="tx1"/>
+          </a:fontRef>
+        </p:style>
+      </p:cxnSp>
+      <p:cxnSp>
+        <p:nvCxnSpPr>
+          <p:cNvPr id="13" name="Straight Connector 12">
+            <a:extLst>
+              <a:ext uri="{FF2B5EF4-FFF2-40B4-BE49-F238E27FC236}">
+                <a16:creationId xmlns:a16="http://schemas.microsoft.com/office/drawing/2014/main" id="{0B7144C6-9C65-4BE6-AFCD-6080448734C8}"/>
+              </a:ext>
+            </a:extLst>
+          </p:cNvPr>
+          <p:cNvCxnSpPr/>
+          <p:nvPr/>
+        </p:nvCxnSpPr>
+        <p:spPr>
+          <a:xfrm>
+            <a:off x="613410" y="4370867"/>
+            <a:ext cx="5486400" cy="0"/>
+          </a:xfrm>
+          <a:prstGeom prst="line">
+            <a:avLst/>
+          </a:prstGeom>
+          <a:ln w="38100">
+            <a:solidFill>
+              <a:schemeClr val="bg1"/>
+            </a:solidFill>
+          </a:ln>
+        </p:spPr>
+        <p:style>
+          <a:lnRef idx="1">
+            <a:schemeClr val="accent1"/>
+          </a:lnRef>
+          <a:fillRef idx="0">
+            <a:schemeClr val="accent1"/>
+          </a:fillRef>
+          <a:effectRef idx="0">
+            <a:schemeClr val="accent1"/>
+          </a:effectRef>
+          <a:fontRef idx="minor">
+            <a:schemeClr val="tx1"/>
+          </a:fontRef>
+        </p:style>
+      </p:cxnSp>
+      <p:cxnSp>
+        <p:nvCxnSpPr>
+          <p:cNvPr id="14" name="Straight Connector 13">
+            <a:extLst>
+              <a:ext uri="{FF2B5EF4-FFF2-40B4-BE49-F238E27FC236}">
+                <a16:creationId xmlns:a16="http://schemas.microsoft.com/office/drawing/2014/main" id="{DA9F57B5-4B3B-4C43-A4A0-E4D43F6A27B8}"/>
+              </a:ext>
+            </a:extLst>
+          </p:cNvPr>
+          <p:cNvCxnSpPr/>
+          <p:nvPr/>
+        </p:nvCxnSpPr>
+        <p:spPr>
+          <a:xfrm>
+            <a:off x="594360" y="6189507"/>
+            <a:ext cx="5504688" cy="0"/>
+          </a:xfrm>
+          <a:prstGeom prst="line">
+            <a:avLst/>
+          </a:prstGeom>
+          <a:ln w="38100">
+            <a:solidFill>
+              <a:schemeClr val="tx1">
+                <a:lumMod val="50000"/>
+                <a:lumOff val="50000"/>
+              </a:schemeClr>
+            </a:solidFill>
+          </a:ln>
+        </p:spPr>
+        <p:style>
+          <a:lnRef idx="1">
+            <a:schemeClr val="accent1"/>
+          </a:lnRef>
+          <a:fillRef idx="0">
+            <a:schemeClr val="accent1"/>
+          </a:fillRef>
+          <a:effectRef idx="0">
+            <a:schemeClr val="accent1"/>
+          </a:effectRef>
+          <a:fontRef idx="minor">
+            <a:schemeClr val="tx1"/>
+          </a:fontRef>
+        </p:style>
+      </p:cxnSp>
+      <p:cxnSp>
+        <p:nvCxnSpPr>
+          <p:cNvPr id="15" name="Straight Connector 14">
+            <a:extLst>
+              <a:ext uri="{FF2B5EF4-FFF2-40B4-BE49-F238E27FC236}">
+                <a16:creationId xmlns:a16="http://schemas.microsoft.com/office/drawing/2014/main" id="{58E55722-0BE7-4FDF-B5E8-01D55A0614B1}"/>
+              </a:ext>
+            </a:extLst>
+          </p:cNvPr>
+          <p:cNvCxnSpPr>
+            <a:cxnSpLocks/>
+          </p:cNvCxnSpPr>
+          <p:nvPr/>
+        </p:nvCxnSpPr>
+        <p:spPr>
+          <a:xfrm flipV="1">
+            <a:off x="613410" y="6014087"/>
+            <a:ext cx="0" cy="189390"/>
+          </a:xfrm>
+          <a:prstGeom prst="line">
+            <a:avLst/>
+          </a:prstGeom>
+          <a:ln w="38100">
+            <a:solidFill>
+              <a:schemeClr val="tx1">
+                <a:lumMod val="50000"/>
+                <a:lumOff val="50000"/>
+              </a:schemeClr>
+            </a:solidFill>
+          </a:ln>
+        </p:spPr>
+        <p:style>
+          <a:lnRef idx="1">
+            <a:schemeClr val="accent1"/>
+          </a:lnRef>
+          <a:fillRef idx="0">
+            <a:schemeClr val="accent1"/>
+          </a:fillRef>
+          <a:effectRef idx="0">
+            <a:schemeClr val="accent1"/>
+          </a:effectRef>
+          <a:fontRef idx="minor">
+            <a:schemeClr val="tx1"/>
+          </a:fontRef>
+        </p:style>
+      </p:cxnSp>
+      <p:cxnSp>
+        <p:nvCxnSpPr>
+          <p:cNvPr id="18" name="Straight Connector 17">
+            <a:extLst>
+              <a:ext uri="{FF2B5EF4-FFF2-40B4-BE49-F238E27FC236}">
+                <a16:creationId xmlns:a16="http://schemas.microsoft.com/office/drawing/2014/main" id="{C39BC865-E459-411F-92F0-074B4E758BD1}"/>
+              </a:ext>
+            </a:extLst>
+          </p:cNvPr>
+          <p:cNvCxnSpPr>
+            <a:cxnSpLocks/>
+          </p:cNvCxnSpPr>
+          <p:nvPr/>
+        </p:nvCxnSpPr>
+        <p:spPr>
+          <a:xfrm flipV="1">
+            <a:off x="1524000" y="6015357"/>
+            <a:ext cx="0" cy="189390"/>
+          </a:xfrm>
+          <a:prstGeom prst="line">
+            <a:avLst/>
+          </a:prstGeom>
+          <a:ln w="38100">
+            <a:solidFill>
+              <a:schemeClr val="tx1">
+                <a:lumMod val="50000"/>
+                <a:lumOff val="50000"/>
+              </a:schemeClr>
+            </a:solidFill>
+          </a:ln>
+        </p:spPr>
+        <p:style>
+          <a:lnRef idx="1">
+            <a:schemeClr val="accent1"/>
+          </a:lnRef>
+          <a:fillRef idx="0">
+            <a:schemeClr val="accent1"/>
+          </a:fillRef>
+          <a:effectRef idx="0">
+            <a:schemeClr val="accent1"/>
+          </a:effectRef>
+          <a:fontRef idx="minor">
+            <a:schemeClr val="tx1"/>
+          </a:fontRef>
+        </p:style>
+      </p:cxnSp>
+      <p:cxnSp>
+        <p:nvCxnSpPr>
+          <p:cNvPr id="19" name="Straight Connector 18">
+            <a:extLst>
+              <a:ext uri="{FF2B5EF4-FFF2-40B4-BE49-F238E27FC236}">
+                <a16:creationId xmlns:a16="http://schemas.microsoft.com/office/drawing/2014/main" id="{4A4194B2-843C-4AE9-9F18-C4160E0A3DEF}"/>
+              </a:ext>
+            </a:extLst>
+          </p:cNvPr>
+          <p:cNvCxnSpPr>
+            <a:cxnSpLocks/>
+          </p:cNvCxnSpPr>
+          <p:nvPr/>
+        </p:nvCxnSpPr>
+        <p:spPr>
+          <a:xfrm flipV="1">
+            <a:off x="2439670" y="6019167"/>
+            <a:ext cx="0" cy="189390"/>
+          </a:xfrm>
+          <a:prstGeom prst="line">
+            <a:avLst/>
+          </a:prstGeom>
+          <a:ln w="38100">
+            <a:solidFill>
+              <a:schemeClr val="tx1">
+                <a:lumMod val="50000"/>
+                <a:lumOff val="50000"/>
+              </a:schemeClr>
+            </a:solidFill>
+          </a:ln>
+        </p:spPr>
+        <p:style>
+          <a:lnRef idx="1">
+            <a:schemeClr val="accent1"/>
+          </a:lnRef>
+          <a:fillRef idx="0">
+            <a:schemeClr val="accent1"/>
+          </a:fillRef>
+          <a:effectRef idx="0">
+            <a:schemeClr val="accent1"/>
+          </a:effectRef>
+          <a:fontRef idx="minor">
+            <a:schemeClr val="tx1"/>
+          </a:fontRef>
+        </p:style>
+      </p:cxnSp>
+      <p:cxnSp>
+        <p:nvCxnSpPr>
+          <p:cNvPr id="21" name="Straight Connector 20">
+            <a:extLst>
+              <a:ext uri="{FF2B5EF4-FFF2-40B4-BE49-F238E27FC236}">
+                <a16:creationId xmlns:a16="http://schemas.microsoft.com/office/drawing/2014/main" id="{8652A2AF-5E32-469D-9F28-23488C92BB24}"/>
+              </a:ext>
+            </a:extLst>
+          </p:cNvPr>
+          <p:cNvCxnSpPr>
+            <a:cxnSpLocks/>
+          </p:cNvCxnSpPr>
+          <p:nvPr/>
+        </p:nvCxnSpPr>
+        <p:spPr>
+          <a:xfrm flipV="1">
+            <a:off x="3354324" y="6010658"/>
+            <a:ext cx="0" cy="189390"/>
+          </a:xfrm>
+          <a:prstGeom prst="line">
+            <a:avLst/>
+          </a:prstGeom>
+          <a:ln w="38100">
+            <a:solidFill>
+              <a:schemeClr val="tx1">
+                <a:lumMod val="50000"/>
+                <a:lumOff val="50000"/>
+              </a:schemeClr>
+            </a:solidFill>
+          </a:ln>
+        </p:spPr>
+        <p:style>
+          <a:lnRef idx="1">
+            <a:schemeClr val="accent1"/>
+          </a:lnRef>
+          <a:fillRef idx="0">
+            <a:schemeClr val="accent1"/>
+          </a:fillRef>
+          <a:effectRef idx="0">
+            <a:schemeClr val="accent1"/>
+          </a:effectRef>
+          <a:fontRef idx="minor">
+            <a:schemeClr val="tx1"/>
+          </a:fontRef>
+        </p:style>
+      </p:cxnSp>
+      <p:cxnSp>
+        <p:nvCxnSpPr>
+          <p:cNvPr id="22" name="Straight Connector 21">
+            <a:extLst>
+              <a:ext uri="{FF2B5EF4-FFF2-40B4-BE49-F238E27FC236}">
+                <a16:creationId xmlns:a16="http://schemas.microsoft.com/office/drawing/2014/main" id="{D24210DF-A34E-42B0-A1FA-C44196C0CD1F}"/>
+              </a:ext>
+            </a:extLst>
+          </p:cNvPr>
+          <p:cNvCxnSpPr>
+            <a:cxnSpLocks/>
+          </p:cNvCxnSpPr>
+          <p:nvPr/>
+        </p:nvCxnSpPr>
+        <p:spPr>
+          <a:xfrm flipV="1">
+            <a:off x="4264914" y="6015738"/>
+            <a:ext cx="0" cy="189390"/>
+          </a:xfrm>
+          <a:prstGeom prst="line">
+            <a:avLst/>
+          </a:prstGeom>
+          <a:ln w="38100">
+            <a:solidFill>
+              <a:schemeClr val="tx1">
+                <a:lumMod val="50000"/>
+                <a:lumOff val="50000"/>
+              </a:schemeClr>
+            </a:solidFill>
+          </a:ln>
+        </p:spPr>
+        <p:style>
+          <a:lnRef idx="1">
+            <a:schemeClr val="accent1"/>
+          </a:lnRef>
+          <a:fillRef idx="0">
+            <a:schemeClr val="accent1"/>
+          </a:fillRef>
+          <a:effectRef idx="0">
+            <a:schemeClr val="accent1"/>
+          </a:effectRef>
+          <a:fontRef idx="minor">
+            <a:schemeClr val="tx1"/>
+          </a:fontRef>
+        </p:style>
+      </p:cxnSp>
+      <p:cxnSp>
+        <p:nvCxnSpPr>
+          <p:cNvPr id="23" name="Straight Connector 22">
+            <a:extLst>
+              <a:ext uri="{FF2B5EF4-FFF2-40B4-BE49-F238E27FC236}">
+                <a16:creationId xmlns:a16="http://schemas.microsoft.com/office/drawing/2014/main" id="{85C9D868-A80C-46DD-9007-6A4E3CF56AD6}"/>
+              </a:ext>
+            </a:extLst>
+          </p:cNvPr>
+          <p:cNvCxnSpPr>
+            <a:cxnSpLocks/>
+          </p:cNvCxnSpPr>
+          <p:nvPr/>
+        </p:nvCxnSpPr>
+        <p:spPr>
+          <a:xfrm flipV="1">
+            <a:off x="5180584" y="6015738"/>
+            <a:ext cx="0" cy="189390"/>
+          </a:xfrm>
+          <a:prstGeom prst="line">
+            <a:avLst/>
+          </a:prstGeom>
+          <a:ln w="38100">
+            <a:solidFill>
+              <a:schemeClr val="tx1">
+                <a:lumMod val="50000"/>
+                <a:lumOff val="50000"/>
+              </a:schemeClr>
+            </a:solidFill>
+          </a:ln>
+        </p:spPr>
+        <p:style>
+          <a:lnRef idx="1">
+            <a:schemeClr val="accent1"/>
+          </a:lnRef>
+          <a:fillRef idx="0">
+            <a:schemeClr val="accent1"/>
+          </a:fillRef>
+          <a:effectRef idx="0">
+            <a:schemeClr val="accent1"/>
+          </a:effectRef>
+          <a:fontRef idx="minor">
+            <a:schemeClr val="tx1"/>
+          </a:fontRef>
+        </p:style>
+      </p:cxnSp>
+      <p:sp>
+        <p:nvSpPr>
+          <p:cNvPr id="24" name="TextBox 23">
+            <a:extLst>
+              <a:ext uri="{FF2B5EF4-FFF2-40B4-BE49-F238E27FC236}">
+                <a16:creationId xmlns:a16="http://schemas.microsoft.com/office/drawing/2014/main" id="{3B5D9F75-5A0B-4272-B0BB-A9AFB7C02D9F}"/>
+              </a:ext>
+            </a:extLst>
+          </p:cNvPr>
+          <p:cNvSpPr txBox="1"/>
+          <p:nvPr/>
+        </p:nvSpPr>
+        <p:spPr>
+          <a:xfrm>
+            <a:off x="490105" y="6165098"/>
+            <a:ext cx="1773382" cy="369332"/>
+          </a:xfrm>
+          <a:prstGeom prst="rect">
+            <a:avLst/>
+          </a:prstGeom>
+          <a:noFill/>
+        </p:spPr>
+        <p:txBody>
+          <a:bodyPr wrap="square" rtlCol="0">
+            <a:spAutoFit/>
+          </a:bodyPr>
+          <a:lstStyle/>
+          <a:p>
+            <a:r>
+              <a:rPr lang="en-US" dirty="0">
+                <a:solidFill>
+                  <a:schemeClr val="tx1">
+                    <a:lumMod val="50000"/>
+                    <a:lumOff val="50000"/>
+                  </a:schemeClr>
+                </a:solidFill>
+                <a:latin typeface="Source Sans Pro" panose="020B0503030403020204" pitchFamily="34" charset="0"/>
+                <a:ea typeface="Source Sans Pro" panose="020B0503030403020204" pitchFamily="34" charset="0"/>
+              </a:rPr>
+              <a:t>2010</a:t>
+            </a:r>
+          </a:p>
+        </p:txBody>
+      </p:sp>
+      <p:sp>
+        <p:nvSpPr>
+          <p:cNvPr id="25" name="TextBox 24">
+            <a:extLst>
+              <a:ext uri="{FF2B5EF4-FFF2-40B4-BE49-F238E27FC236}">
+                <a16:creationId xmlns:a16="http://schemas.microsoft.com/office/drawing/2014/main" id="{84E500EC-CD76-41A8-AB3C-641C0EA117DD}"/>
+              </a:ext>
+            </a:extLst>
+          </p:cNvPr>
+          <p:cNvSpPr txBox="1"/>
+          <p:nvPr/>
+        </p:nvSpPr>
+        <p:spPr>
+          <a:xfrm>
+            <a:off x="1311473" y="6165098"/>
+            <a:ext cx="423977" cy="369332"/>
+          </a:xfrm>
+          <a:prstGeom prst="rect">
+            <a:avLst/>
+          </a:prstGeom>
+          <a:noFill/>
+        </p:spPr>
+        <p:txBody>
+          <a:bodyPr wrap="square" rtlCol="0">
+            <a:spAutoFit/>
+          </a:bodyPr>
+          <a:lstStyle/>
+          <a:p>
+            <a:r>
+              <a:rPr lang="en-US" dirty="0">
+                <a:solidFill>
+                  <a:schemeClr val="tx1">
+                    <a:lumMod val="50000"/>
+                    <a:lumOff val="50000"/>
+                  </a:schemeClr>
+                </a:solidFill>
+                <a:latin typeface="Source Sans Pro" panose="020B0503030403020204" pitchFamily="34" charset="0"/>
+                <a:ea typeface="Source Sans Pro" panose="020B0503030403020204" pitchFamily="34" charset="0"/>
+              </a:rPr>
+              <a:t>12</a:t>
+            </a:r>
+          </a:p>
+        </p:txBody>
+      </p:sp>
+      <p:sp>
+        <p:nvSpPr>
+          <p:cNvPr id="26" name="TextBox 25">
+            <a:extLst>
+              <a:ext uri="{FF2B5EF4-FFF2-40B4-BE49-F238E27FC236}">
+                <a16:creationId xmlns:a16="http://schemas.microsoft.com/office/drawing/2014/main" id="{4B2B25AD-E411-482C-9F0D-2D2C81918244}"/>
+              </a:ext>
+            </a:extLst>
+          </p:cNvPr>
+          <p:cNvSpPr txBox="1"/>
+          <p:nvPr/>
+        </p:nvSpPr>
+        <p:spPr>
+          <a:xfrm>
+            <a:off x="2222062" y="6165098"/>
+            <a:ext cx="423977" cy="369332"/>
+          </a:xfrm>
+          <a:prstGeom prst="rect">
+            <a:avLst/>
+          </a:prstGeom>
+          <a:noFill/>
+        </p:spPr>
+        <p:txBody>
+          <a:bodyPr wrap="square" rtlCol="0">
+            <a:spAutoFit/>
+          </a:bodyPr>
+          <a:lstStyle/>
+          <a:p>
+            <a:r>
+              <a:rPr lang="en-US" dirty="0">
+                <a:solidFill>
+                  <a:schemeClr val="tx1">
+                    <a:lumMod val="50000"/>
+                    <a:lumOff val="50000"/>
+                  </a:schemeClr>
+                </a:solidFill>
+                <a:latin typeface="Source Sans Pro" panose="020B0503030403020204" pitchFamily="34" charset="0"/>
+                <a:ea typeface="Source Sans Pro" panose="020B0503030403020204" pitchFamily="34" charset="0"/>
+              </a:rPr>
+              <a:t>14</a:t>
+            </a:r>
+          </a:p>
+        </p:txBody>
+      </p:sp>
+      <p:sp>
+        <p:nvSpPr>
+          <p:cNvPr id="27" name="TextBox 26">
+            <a:extLst>
+              <a:ext uri="{FF2B5EF4-FFF2-40B4-BE49-F238E27FC236}">
+                <a16:creationId xmlns:a16="http://schemas.microsoft.com/office/drawing/2014/main" id="{CFD4DBAD-1EED-4826-9372-38D4EF2F59FE}"/>
+              </a:ext>
+            </a:extLst>
+          </p:cNvPr>
+          <p:cNvSpPr txBox="1"/>
+          <p:nvPr/>
+        </p:nvSpPr>
+        <p:spPr>
+          <a:xfrm>
+            <a:off x="3148341" y="6165098"/>
+            <a:ext cx="423977" cy="369332"/>
+          </a:xfrm>
+          <a:prstGeom prst="rect">
+            <a:avLst/>
+          </a:prstGeom>
+          <a:noFill/>
+        </p:spPr>
+        <p:txBody>
+          <a:bodyPr wrap="square" rtlCol="0">
+            <a:spAutoFit/>
+          </a:bodyPr>
+          <a:lstStyle/>
+          <a:p>
+            <a:r>
+              <a:rPr lang="en-US" dirty="0">
+                <a:solidFill>
+                  <a:schemeClr val="tx1">
+                    <a:lumMod val="50000"/>
+                    <a:lumOff val="50000"/>
+                  </a:schemeClr>
+                </a:solidFill>
+                <a:latin typeface="Source Sans Pro" panose="020B0503030403020204" pitchFamily="34" charset="0"/>
+                <a:ea typeface="Source Sans Pro" panose="020B0503030403020204" pitchFamily="34" charset="0"/>
+              </a:rPr>
+              <a:t>16</a:t>
+            </a:r>
+          </a:p>
+        </p:txBody>
+      </p:sp>
+      <p:sp>
+        <p:nvSpPr>
+          <p:cNvPr id="28" name="TextBox 27">
+            <a:extLst>
+              <a:ext uri="{FF2B5EF4-FFF2-40B4-BE49-F238E27FC236}">
+                <a16:creationId xmlns:a16="http://schemas.microsoft.com/office/drawing/2014/main" id="{513E6611-0EED-4F13-AB94-0B15EBAE5C54}"/>
+              </a:ext>
+            </a:extLst>
+          </p:cNvPr>
+          <p:cNvSpPr txBox="1"/>
+          <p:nvPr/>
+        </p:nvSpPr>
+        <p:spPr>
+          <a:xfrm>
+            <a:off x="4052385" y="6167897"/>
+            <a:ext cx="423977" cy="369332"/>
+          </a:xfrm>
+          <a:prstGeom prst="rect">
+            <a:avLst/>
+          </a:prstGeom>
+          <a:noFill/>
+        </p:spPr>
+        <p:txBody>
+          <a:bodyPr wrap="square" rtlCol="0">
+            <a:spAutoFit/>
+          </a:bodyPr>
+          <a:lstStyle/>
+          <a:p>
+            <a:r>
+              <a:rPr lang="en-US" dirty="0">
+                <a:solidFill>
+                  <a:schemeClr val="tx1">
+                    <a:lumMod val="50000"/>
+                    <a:lumOff val="50000"/>
+                  </a:schemeClr>
+                </a:solidFill>
+                <a:latin typeface="Source Sans Pro" panose="020B0503030403020204" pitchFamily="34" charset="0"/>
+                <a:ea typeface="Source Sans Pro" panose="020B0503030403020204" pitchFamily="34" charset="0"/>
+              </a:rPr>
+              <a:t>18</a:t>
+            </a:r>
+          </a:p>
+        </p:txBody>
+      </p:sp>
+      <p:sp>
+        <p:nvSpPr>
+          <p:cNvPr id="29" name="TextBox 28">
+            <a:extLst>
+              <a:ext uri="{FF2B5EF4-FFF2-40B4-BE49-F238E27FC236}">
+                <a16:creationId xmlns:a16="http://schemas.microsoft.com/office/drawing/2014/main" id="{F6F40F13-0820-464C-A5D2-3277CBEAB007}"/>
+              </a:ext>
+            </a:extLst>
+          </p:cNvPr>
+          <p:cNvSpPr txBox="1"/>
+          <p:nvPr/>
+        </p:nvSpPr>
+        <p:spPr>
+          <a:xfrm>
+            <a:off x="4955193" y="6165098"/>
+            <a:ext cx="423977" cy="369332"/>
+          </a:xfrm>
+          <a:prstGeom prst="rect">
+            <a:avLst/>
+          </a:prstGeom>
+          <a:noFill/>
+        </p:spPr>
+        <p:txBody>
+          <a:bodyPr wrap="square" rtlCol="0">
+            <a:spAutoFit/>
+          </a:bodyPr>
+          <a:lstStyle/>
+          <a:p>
+            <a:r>
+              <a:rPr lang="en-US" dirty="0">
+                <a:solidFill>
+                  <a:schemeClr val="tx1">
+                    <a:lumMod val="50000"/>
+                    <a:lumOff val="50000"/>
+                  </a:schemeClr>
+                </a:solidFill>
+                <a:latin typeface="Source Sans Pro" panose="020B0503030403020204" pitchFamily="34" charset="0"/>
+                <a:ea typeface="Source Sans Pro" panose="020B0503030403020204" pitchFamily="34" charset="0"/>
+              </a:rPr>
+              <a:t>20</a:t>
+            </a:r>
+          </a:p>
+        </p:txBody>
+      </p:sp>
+      <p:sp>
+        <p:nvSpPr>
+          <p:cNvPr id="30" name="TextBox 29">
+            <a:extLst>
+              <a:ext uri="{FF2B5EF4-FFF2-40B4-BE49-F238E27FC236}">
+                <a16:creationId xmlns:a16="http://schemas.microsoft.com/office/drawing/2014/main" id="{F444B6D5-7B4D-4B21-B33C-60E30D88A7DB}"/>
+              </a:ext>
+            </a:extLst>
+          </p:cNvPr>
+          <p:cNvSpPr txBox="1"/>
+          <p:nvPr/>
+        </p:nvSpPr>
+        <p:spPr>
+          <a:xfrm>
+            <a:off x="5898182" y="6165098"/>
+            <a:ext cx="423978" cy="369332"/>
+          </a:xfrm>
+          <a:prstGeom prst="rect">
+            <a:avLst/>
+          </a:prstGeom>
+          <a:noFill/>
+        </p:spPr>
+        <p:txBody>
+          <a:bodyPr wrap="square" rtlCol="0">
+            <a:spAutoFit/>
+          </a:bodyPr>
+          <a:lstStyle/>
+          <a:p>
+            <a:r>
+              <a:rPr lang="en-US" dirty="0">
+                <a:solidFill>
+                  <a:schemeClr val="tx1">
+                    <a:lumMod val="50000"/>
+                    <a:lumOff val="50000"/>
+                  </a:schemeClr>
+                </a:solidFill>
+                <a:latin typeface="Source Sans Pro" panose="020B0503030403020204" pitchFamily="34" charset="0"/>
+                <a:ea typeface="Source Sans Pro" panose="020B0503030403020204" pitchFamily="34" charset="0"/>
+              </a:rPr>
+              <a:t>22</a:t>
+            </a:r>
+          </a:p>
+        </p:txBody>
+      </p:sp>
+      <p:cxnSp>
+        <p:nvCxnSpPr>
+          <p:cNvPr id="31" name="Straight Connector 30">
+            <a:extLst>
+              <a:ext uri="{FF2B5EF4-FFF2-40B4-BE49-F238E27FC236}">
+                <a16:creationId xmlns:a16="http://schemas.microsoft.com/office/drawing/2014/main" id="{DAB52994-8B05-4E0F-8C56-ADF33C4C7483}"/>
+              </a:ext>
+            </a:extLst>
+          </p:cNvPr>
+          <p:cNvCxnSpPr>
+            <a:cxnSpLocks/>
+          </p:cNvCxnSpPr>
+          <p:nvPr/>
+        </p:nvCxnSpPr>
+        <p:spPr>
+          <a:xfrm flipV="1">
+            <a:off x="6094984" y="6016627"/>
+            <a:ext cx="0" cy="189390"/>
+          </a:xfrm>
+          <a:prstGeom prst="line">
+            <a:avLst/>
+          </a:prstGeom>
+          <a:ln w="38100">
+            <a:solidFill>
+              <a:schemeClr val="tx1">
+                <a:lumMod val="50000"/>
+                <a:lumOff val="50000"/>
+              </a:schemeClr>
+            </a:solidFill>
+          </a:ln>
+        </p:spPr>
+        <p:style>
+          <a:lnRef idx="1">
+            <a:schemeClr val="accent1"/>
+          </a:lnRef>
+          <a:fillRef idx="0">
+            <a:schemeClr val="accent1"/>
+          </a:fillRef>
+          <a:effectRef idx="0">
+            <a:schemeClr val="accent1"/>
+          </a:effectRef>
+          <a:fontRef idx="minor">
+            <a:schemeClr val="tx1"/>
+          </a:fontRef>
+        </p:style>
+      </p:cxnSp>
+      <p:cxnSp>
+        <p:nvCxnSpPr>
+          <p:cNvPr id="32" name="Straight Connector 31">
+            <a:extLst>
+              <a:ext uri="{FF2B5EF4-FFF2-40B4-BE49-F238E27FC236}">
+                <a16:creationId xmlns:a16="http://schemas.microsoft.com/office/drawing/2014/main" id="{E7D83356-448F-4917-BAB0-2F5B53EEEEF3}"/>
+              </a:ext>
+            </a:extLst>
+          </p:cNvPr>
+          <p:cNvCxnSpPr/>
+          <p:nvPr/>
+        </p:nvCxnSpPr>
+        <p:spPr>
+          <a:xfrm>
+            <a:off x="616148" y="4370867"/>
+            <a:ext cx="1828800" cy="0"/>
+          </a:xfrm>
+          <a:prstGeom prst="line">
+            <a:avLst/>
+          </a:prstGeom>
+          <a:ln w="38100">
+            <a:solidFill>
+              <a:schemeClr val="tx1">
+                <a:lumMod val="50000"/>
+                <a:lumOff val="50000"/>
+              </a:schemeClr>
+            </a:solidFill>
+            <a:headEnd type="oval" w="med" len="med"/>
+            <a:tailEnd type="oval" w="med" len="med"/>
+          </a:ln>
+        </p:spPr>
+        <p:style>
+          <a:lnRef idx="1">
+            <a:schemeClr val="accent1"/>
+          </a:lnRef>
+          <a:fillRef idx="0">
+            <a:schemeClr val="accent1"/>
+          </a:fillRef>
+          <a:effectRef idx="0">
+            <a:schemeClr val="accent1"/>
+          </a:effectRef>
+          <a:fontRef idx="minor">
+            <a:schemeClr val="tx1"/>
+          </a:fontRef>
+        </p:style>
+      </p:cxnSp>
+      <p:cxnSp>
+        <p:nvCxnSpPr>
+          <p:cNvPr id="33" name="Straight Connector 32">
+            <a:extLst>
+              <a:ext uri="{FF2B5EF4-FFF2-40B4-BE49-F238E27FC236}">
+                <a16:creationId xmlns:a16="http://schemas.microsoft.com/office/drawing/2014/main" id="{68EAC85E-12D0-4A66-BA00-E60277042635}"/>
+              </a:ext>
+            </a:extLst>
+          </p:cNvPr>
+          <p:cNvCxnSpPr/>
+          <p:nvPr/>
+        </p:nvCxnSpPr>
+        <p:spPr>
+          <a:xfrm>
+            <a:off x="2439924" y="5264947"/>
+            <a:ext cx="914400" cy="0"/>
+          </a:xfrm>
+          <a:prstGeom prst="line">
+            <a:avLst/>
+          </a:prstGeom>
+          <a:ln w="38100">
+            <a:solidFill>
+              <a:schemeClr val="tx1">
+                <a:lumMod val="50000"/>
+                <a:lumOff val="50000"/>
+              </a:schemeClr>
+            </a:solidFill>
+            <a:headEnd type="oval" w="med" len="med"/>
+            <a:tailEnd type="oval" w="med" len="med"/>
+          </a:ln>
+        </p:spPr>
+        <p:style>
+          <a:lnRef idx="1">
+            <a:schemeClr val="accent1"/>
+          </a:lnRef>
+          <a:fillRef idx="0">
+            <a:schemeClr val="accent1"/>
+          </a:fillRef>
+          <a:effectRef idx="0">
+            <a:schemeClr val="accent1"/>
+          </a:effectRef>
+          <a:fontRef idx="minor">
+            <a:schemeClr val="tx1"/>
+          </a:fontRef>
+        </p:style>
+      </p:cxnSp>
+      <p:cxnSp>
+        <p:nvCxnSpPr>
+          <p:cNvPr id="34" name="Straight Connector 33">
+            <a:extLst>
+              <a:ext uri="{FF2B5EF4-FFF2-40B4-BE49-F238E27FC236}">
+                <a16:creationId xmlns:a16="http://schemas.microsoft.com/office/drawing/2014/main" id="{8A853190-1C63-4A99-AC47-89FD90690B30}"/>
+              </a:ext>
+            </a:extLst>
+          </p:cNvPr>
+          <p:cNvCxnSpPr/>
+          <p:nvPr/>
+        </p:nvCxnSpPr>
+        <p:spPr>
+          <a:xfrm>
+            <a:off x="3354324" y="3437577"/>
+            <a:ext cx="914400" cy="0"/>
+          </a:xfrm>
+          <a:prstGeom prst="line">
+            <a:avLst/>
+          </a:prstGeom>
+          <a:ln w="38100">
+            <a:solidFill>
+              <a:schemeClr val="tx1">
+                <a:lumMod val="50000"/>
+                <a:lumOff val="50000"/>
+              </a:schemeClr>
+            </a:solidFill>
+            <a:headEnd type="oval" w="med" len="med"/>
+            <a:tailEnd type="oval" w="med" len="med"/>
+          </a:ln>
+        </p:spPr>
+        <p:style>
+          <a:lnRef idx="1">
+            <a:schemeClr val="accent1"/>
+          </a:lnRef>
+          <a:fillRef idx="0">
+            <a:schemeClr val="accent1"/>
+          </a:fillRef>
+          <a:effectRef idx="0">
+            <a:schemeClr val="accent1"/>
+          </a:effectRef>
+          <a:fontRef idx="minor">
+            <a:schemeClr val="tx1"/>
+          </a:fontRef>
+        </p:style>
+      </p:cxnSp>
+      <p:cxnSp>
+        <p:nvCxnSpPr>
+          <p:cNvPr id="35" name="Straight Connector 34">
+            <a:extLst>
+              <a:ext uri="{FF2B5EF4-FFF2-40B4-BE49-F238E27FC236}">
+                <a16:creationId xmlns:a16="http://schemas.microsoft.com/office/drawing/2014/main" id="{86C53388-D65A-4F73-8EE1-A6BD3B1EE902}"/>
+              </a:ext>
+            </a:extLst>
+          </p:cNvPr>
+          <p:cNvCxnSpPr/>
+          <p:nvPr/>
+        </p:nvCxnSpPr>
+        <p:spPr>
+          <a:xfrm>
+            <a:off x="4266184" y="2516815"/>
+            <a:ext cx="1828800" cy="0"/>
+          </a:xfrm>
+          <a:prstGeom prst="line">
+            <a:avLst/>
+          </a:prstGeom>
+          <a:ln w="38100">
+            <a:solidFill>
+              <a:schemeClr val="tx1">
+                <a:lumMod val="50000"/>
+                <a:lumOff val="50000"/>
+              </a:schemeClr>
+            </a:solidFill>
+            <a:headEnd type="oval" w="med" len="med"/>
+            <a:tailEnd type="oval" w="med" len="med"/>
+          </a:ln>
+        </p:spPr>
+        <p:style>
+          <a:lnRef idx="1">
+            <a:schemeClr val="accent1"/>
+          </a:lnRef>
+          <a:fillRef idx="0">
+            <a:schemeClr val="accent1"/>
+          </a:fillRef>
+          <a:effectRef idx="0">
+            <a:schemeClr val="accent1"/>
+          </a:effectRef>
+          <a:fontRef idx="minor">
+            <a:schemeClr val="tx1"/>
+          </a:fontRef>
+        </p:style>
+      </p:cxnSp>
+      <p:sp>
+        <p:nvSpPr>
+          <p:cNvPr id="36" name="TextBox 35">
+            <a:extLst>
+              <a:ext uri="{FF2B5EF4-FFF2-40B4-BE49-F238E27FC236}">
+                <a16:creationId xmlns:a16="http://schemas.microsoft.com/office/drawing/2014/main" id="{9D930D4E-5010-4764-AA26-06CA7288F785}"/>
+              </a:ext>
+            </a:extLst>
+          </p:cNvPr>
+          <p:cNvSpPr txBox="1"/>
+          <p:nvPr/>
+        </p:nvSpPr>
+        <p:spPr>
+          <a:xfrm>
+            <a:off x="806450" y="4384858"/>
+            <a:ext cx="1773382" cy="646331"/>
+          </a:xfrm>
+          <a:prstGeom prst="rect">
+            <a:avLst/>
+          </a:prstGeom>
+          <a:noFill/>
+        </p:spPr>
+        <p:txBody>
+          <a:bodyPr wrap="square" rtlCol="0">
+            <a:spAutoFit/>
+          </a:bodyPr>
+          <a:lstStyle/>
+          <a:p>
+            <a:pPr algn="r"/>
+            <a:r>
+              <a:rPr lang="en-US" dirty="0">
+                <a:solidFill>
+                  <a:schemeClr val="tx1">
+                    <a:lumMod val="50000"/>
+                    <a:lumOff val="50000"/>
+                  </a:schemeClr>
+                </a:solidFill>
+                <a:latin typeface="Source Sans Pro" panose="020B0503030403020204" pitchFamily="34" charset="0"/>
+                <a:ea typeface="Source Sans Pro" panose="020B0503030403020204" pitchFamily="34" charset="0"/>
+              </a:rPr>
+              <a:t>B.Tech. in </a:t>
+            </a:r>
+          </a:p>
+          <a:p>
+            <a:pPr algn="r"/>
+            <a:r>
+              <a:rPr lang="en-US" dirty="0">
+                <a:solidFill>
+                  <a:schemeClr val="tx1">
+                    <a:lumMod val="50000"/>
+                    <a:lumOff val="50000"/>
+                  </a:schemeClr>
+                </a:solidFill>
+                <a:latin typeface="Source Sans Pro" panose="020B0503030403020204" pitchFamily="34" charset="0"/>
+                <a:ea typeface="Source Sans Pro" panose="020B0503030403020204" pitchFamily="34" charset="0"/>
+              </a:rPr>
+              <a:t>civil engg.</a:t>
+            </a:r>
+          </a:p>
+        </p:txBody>
+      </p:sp>
+      <p:sp>
+        <p:nvSpPr>
+          <p:cNvPr id="38" name="TextBox 37">
+            <a:extLst>
+              <a:ext uri="{FF2B5EF4-FFF2-40B4-BE49-F238E27FC236}">
+                <a16:creationId xmlns:a16="http://schemas.microsoft.com/office/drawing/2014/main" id="{4DF7FB48-5611-4937-85BB-CC291C61261F}"/>
+              </a:ext>
+            </a:extLst>
+          </p:cNvPr>
+          <p:cNvSpPr txBox="1"/>
+          <p:nvPr/>
+        </p:nvSpPr>
+        <p:spPr>
+          <a:xfrm>
+            <a:off x="1693141" y="5281414"/>
+            <a:ext cx="1773382" cy="646331"/>
+          </a:xfrm>
+          <a:prstGeom prst="rect">
+            <a:avLst/>
+          </a:prstGeom>
+          <a:noFill/>
+        </p:spPr>
+        <p:txBody>
+          <a:bodyPr wrap="square" rtlCol="0">
+            <a:spAutoFit/>
+          </a:bodyPr>
+          <a:lstStyle/>
+          <a:p>
+            <a:pPr algn="r"/>
+            <a:r>
+              <a:rPr lang="en-US" dirty="0">
+                <a:solidFill>
+                  <a:schemeClr val="tx1">
+                    <a:lumMod val="50000"/>
+                    <a:lumOff val="50000"/>
+                  </a:schemeClr>
+                </a:solidFill>
+                <a:latin typeface="Source Sans Pro" panose="020B0503030403020204" pitchFamily="34" charset="0"/>
+                <a:ea typeface="Source Sans Pro" panose="020B0503030403020204" pitchFamily="34" charset="0"/>
+              </a:rPr>
+              <a:t>Field engg. </a:t>
+            </a:r>
+          </a:p>
+          <a:p>
+            <a:pPr algn="r"/>
+            <a:r>
+              <a:rPr lang="en-US" dirty="0">
+                <a:solidFill>
+                  <a:schemeClr val="tx1">
+                    <a:lumMod val="50000"/>
+                    <a:lumOff val="50000"/>
+                  </a:schemeClr>
+                </a:solidFill>
+                <a:latin typeface="Source Sans Pro" panose="020B0503030403020204" pitchFamily="34" charset="0"/>
+                <a:ea typeface="Source Sans Pro" panose="020B0503030403020204" pitchFamily="34" charset="0"/>
+              </a:rPr>
+              <a:t>in Schlumberger</a:t>
+            </a:r>
+          </a:p>
+        </p:txBody>
+      </p:sp>
+      <p:sp>
+        <p:nvSpPr>
+          <p:cNvPr id="40" name="TextBox 39">
+            <a:extLst>
+              <a:ext uri="{FF2B5EF4-FFF2-40B4-BE49-F238E27FC236}">
+                <a16:creationId xmlns:a16="http://schemas.microsoft.com/office/drawing/2014/main" id="{0D94B315-3210-4B02-BC99-D84C72891A18}"/>
+              </a:ext>
+            </a:extLst>
+          </p:cNvPr>
+          <p:cNvSpPr txBox="1"/>
+          <p:nvPr/>
+        </p:nvSpPr>
+        <p:spPr>
+          <a:xfrm>
+            <a:off x="2638419" y="3451387"/>
+            <a:ext cx="1773382" cy="646331"/>
+          </a:xfrm>
+          <a:prstGeom prst="rect">
+            <a:avLst/>
+          </a:prstGeom>
+          <a:noFill/>
+        </p:spPr>
+        <p:txBody>
+          <a:bodyPr wrap="square" rtlCol="0">
+            <a:spAutoFit/>
+          </a:bodyPr>
+          <a:lstStyle/>
+          <a:p>
+            <a:pPr algn="r"/>
+            <a:r>
+              <a:rPr lang="en-US" dirty="0">
+                <a:solidFill>
+                  <a:schemeClr val="tx1">
+                    <a:lumMod val="50000"/>
+                    <a:lumOff val="50000"/>
+                  </a:schemeClr>
+                </a:solidFill>
+                <a:latin typeface="Source Sans Pro" panose="020B0503030403020204" pitchFamily="34" charset="0"/>
+                <a:ea typeface="Source Sans Pro" panose="020B0503030403020204" pitchFamily="34" charset="0"/>
+              </a:rPr>
+              <a:t>M.S. in </a:t>
+            </a:r>
+          </a:p>
+          <a:p>
+            <a:pPr algn="r"/>
+            <a:r>
+              <a:rPr lang="en-US" dirty="0">
+                <a:solidFill>
+                  <a:schemeClr val="tx1">
+                    <a:lumMod val="50000"/>
+                    <a:lumOff val="50000"/>
+                  </a:schemeClr>
+                </a:solidFill>
+                <a:latin typeface="Source Sans Pro" panose="020B0503030403020204" pitchFamily="34" charset="0"/>
+                <a:ea typeface="Source Sans Pro" panose="020B0503030403020204" pitchFamily="34" charset="0"/>
+              </a:rPr>
+              <a:t>hydrology</a:t>
+            </a:r>
+          </a:p>
+        </p:txBody>
+      </p:sp>
+      <p:sp>
+        <p:nvSpPr>
+          <p:cNvPr id="41" name="TextBox 40">
+            <a:extLst>
+              <a:ext uri="{FF2B5EF4-FFF2-40B4-BE49-F238E27FC236}">
+                <a16:creationId xmlns:a16="http://schemas.microsoft.com/office/drawing/2014/main" id="{F8E54FF0-49C7-4EEB-BC7B-447E55EE780C}"/>
+              </a:ext>
+            </a:extLst>
+          </p:cNvPr>
+          <p:cNvSpPr txBox="1"/>
+          <p:nvPr/>
+        </p:nvSpPr>
+        <p:spPr>
+          <a:xfrm>
+            <a:off x="4295394" y="2523290"/>
+            <a:ext cx="1920269" cy="646331"/>
+          </a:xfrm>
+          <a:prstGeom prst="rect">
+            <a:avLst/>
+          </a:prstGeom>
+          <a:noFill/>
+        </p:spPr>
+        <p:txBody>
+          <a:bodyPr wrap="square" rtlCol="0">
+            <a:spAutoFit/>
+          </a:bodyPr>
+          <a:lstStyle/>
+          <a:p>
+            <a:pPr algn="r"/>
+            <a:r>
+              <a:rPr lang="en-US" dirty="0">
+                <a:solidFill>
+                  <a:schemeClr val="tx1">
+                    <a:lumMod val="50000"/>
+                    <a:lumOff val="50000"/>
+                  </a:schemeClr>
+                </a:solidFill>
+                <a:latin typeface="Source Sans Pro" panose="020B0503030403020204" pitchFamily="34" charset="0"/>
+                <a:ea typeface="Source Sans Pro" panose="020B0503030403020204" pitchFamily="34" charset="0"/>
+              </a:rPr>
+              <a:t>Ph.D. in forest </a:t>
+            </a:r>
+          </a:p>
+          <a:p>
+            <a:pPr algn="r"/>
+            <a:r>
+              <a:rPr lang="en-US" dirty="0">
+                <a:solidFill>
+                  <a:schemeClr val="tx1">
+                    <a:lumMod val="50000"/>
+                    <a:lumOff val="50000"/>
+                  </a:schemeClr>
+                </a:solidFill>
+                <a:latin typeface="Source Sans Pro" panose="020B0503030403020204" pitchFamily="34" charset="0"/>
+                <a:ea typeface="Source Sans Pro" panose="020B0503030403020204" pitchFamily="34" charset="0"/>
+              </a:rPr>
+              <a:t>health monitoring</a:t>
+            </a:r>
+          </a:p>
+        </p:txBody>
+      </p:sp>
+      <p:cxnSp>
+        <p:nvCxnSpPr>
+          <p:cNvPr id="42" name="Straight Connector 41">
+            <a:extLst>
+              <a:ext uri="{FF2B5EF4-FFF2-40B4-BE49-F238E27FC236}">
+                <a16:creationId xmlns:a16="http://schemas.microsoft.com/office/drawing/2014/main" id="{0A4C2C7A-FA5C-483F-A1BE-973A4754FF54}"/>
+              </a:ext>
+            </a:extLst>
+          </p:cNvPr>
+          <p:cNvCxnSpPr/>
+          <p:nvPr/>
+        </p:nvCxnSpPr>
+        <p:spPr>
+          <a:xfrm>
+            <a:off x="613410" y="1613776"/>
+            <a:ext cx="5486400" cy="0"/>
+          </a:xfrm>
+          <a:prstGeom prst="line">
+            <a:avLst/>
+          </a:prstGeom>
+          <a:ln w="38100">
+            <a:solidFill>
+              <a:schemeClr val="bg1"/>
+            </a:solidFill>
+          </a:ln>
+        </p:spPr>
+        <p:style>
+          <a:lnRef idx="1">
+            <a:schemeClr val="accent1"/>
+          </a:lnRef>
+          <a:fillRef idx="0">
+            <a:schemeClr val="accent1"/>
+          </a:fillRef>
+          <a:effectRef idx="0">
+            <a:schemeClr val="accent1"/>
+          </a:effectRef>
+          <a:fontRef idx="minor">
+            <a:schemeClr val="tx1"/>
+          </a:fontRef>
+        </p:style>
+      </p:cxnSp>
+      <p:cxnSp>
+        <p:nvCxnSpPr>
+          <p:cNvPr id="43" name="Straight Connector 42">
+            <a:extLst>
+              <a:ext uri="{FF2B5EF4-FFF2-40B4-BE49-F238E27FC236}">
+                <a16:creationId xmlns:a16="http://schemas.microsoft.com/office/drawing/2014/main" id="{95F7DD96-7271-4F45-AA2F-60181D74FF9E}"/>
+              </a:ext>
+            </a:extLst>
+          </p:cNvPr>
+          <p:cNvCxnSpPr/>
+          <p:nvPr/>
+        </p:nvCxnSpPr>
+        <p:spPr>
+          <a:xfrm>
+            <a:off x="661035" y="2608902"/>
+            <a:ext cx="0" cy="731520"/>
+          </a:xfrm>
+          <a:prstGeom prst="line">
+            <a:avLst/>
+          </a:prstGeom>
+          <a:ln w="38100">
+            <a:solidFill>
+              <a:schemeClr val="tx1">
+                <a:lumMod val="50000"/>
+                <a:lumOff val="50000"/>
+              </a:schemeClr>
+            </a:solidFill>
+            <a:headEnd type="triangle" w="lg" len="lg"/>
+          </a:ln>
+        </p:spPr>
+        <p:style>
+          <a:lnRef idx="1">
+            <a:schemeClr val="accent1"/>
+          </a:lnRef>
+          <a:fillRef idx="0">
+            <a:schemeClr val="accent1"/>
+          </a:fillRef>
+          <a:effectRef idx="0">
+            <a:schemeClr val="accent1"/>
+          </a:effectRef>
+          <a:fontRef idx="minor">
+            <a:schemeClr val="tx1"/>
+          </a:fontRef>
+        </p:style>
+      </p:cxnSp>
+      <p:sp>
+        <p:nvSpPr>
+          <p:cNvPr id="44" name="TextBox 43">
+            <a:extLst>
+              <a:ext uri="{FF2B5EF4-FFF2-40B4-BE49-F238E27FC236}">
+                <a16:creationId xmlns:a16="http://schemas.microsoft.com/office/drawing/2014/main" id="{27A13EC8-9555-4BB3-B64B-B87B4008261F}"/>
+              </a:ext>
+            </a:extLst>
+          </p:cNvPr>
+          <p:cNvSpPr txBox="1"/>
+          <p:nvPr/>
+        </p:nvSpPr>
+        <p:spPr>
+          <a:xfrm>
+            <a:off x="733743" y="2538336"/>
+            <a:ext cx="1773382" cy="646331"/>
+          </a:xfrm>
+          <a:prstGeom prst="rect">
+            <a:avLst/>
+          </a:prstGeom>
+          <a:noFill/>
+        </p:spPr>
+        <p:txBody>
+          <a:bodyPr wrap="square" rtlCol="0">
+            <a:spAutoFit/>
+          </a:bodyPr>
+          <a:lstStyle/>
+          <a:p>
+            <a:r>
+              <a:rPr lang="en-US" dirty="0">
+                <a:solidFill>
+                  <a:schemeClr val="tx1">
+                    <a:lumMod val="50000"/>
+                    <a:lumOff val="50000"/>
+                  </a:schemeClr>
+                </a:solidFill>
+                <a:latin typeface="Source Sans Pro" panose="020B0503030403020204" pitchFamily="34" charset="0"/>
+                <a:ea typeface="Source Sans Pro" panose="020B0503030403020204" pitchFamily="34" charset="0"/>
+              </a:rPr>
+              <a:t>Greater focus on sustainability</a:t>
+            </a:r>
+          </a:p>
+        </p:txBody>
+      </p:sp>
+      <p:cxnSp>
+        <p:nvCxnSpPr>
+          <p:cNvPr id="45" name="Straight Connector 44">
+            <a:extLst>
+              <a:ext uri="{FF2B5EF4-FFF2-40B4-BE49-F238E27FC236}">
+                <a16:creationId xmlns:a16="http://schemas.microsoft.com/office/drawing/2014/main" id="{948A953B-26AC-4B8E-843E-FA61055B37C1}"/>
+              </a:ext>
+            </a:extLst>
+          </p:cNvPr>
+          <p:cNvCxnSpPr/>
+          <p:nvPr/>
+        </p:nvCxnSpPr>
+        <p:spPr>
+          <a:xfrm>
+            <a:off x="5527125" y="1613776"/>
+            <a:ext cx="228600" cy="0"/>
+          </a:xfrm>
+          <a:prstGeom prst="line">
+            <a:avLst/>
+          </a:prstGeom>
+          <a:ln w="38100">
+            <a:solidFill>
+              <a:schemeClr val="bg2">
+                <a:lumMod val="50000"/>
+              </a:schemeClr>
+            </a:solidFill>
+            <a:headEnd type="oval" w="med" len="med"/>
+            <a:tailEnd type="oval" w="med" len="med"/>
+          </a:ln>
+        </p:spPr>
+        <p:style>
+          <a:lnRef idx="1">
+            <a:schemeClr val="accent1"/>
+          </a:lnRef>
+          <a:fillRef idx="0">
+            <a:schemeClr val="accent1"/>
+          </a:fillRef>
+          <a:effectRef idx="0">
+            <a:schemeClr val="accent1"/>
+          </a:effectRef>
+          <a:fontRef idx="minor">
+            <a:schemeClr val="tx1"/>
+          </a:fontRef>
+        </p:style>
+      </p:cxnSp>
+      <p:sp>
+        <p:nvSpPr>
+          <p:cNvPr id="46" name="TextBox 45">
+            <a:extLst>
+              <a:ext uri="{FF2B5EF4-FFF2-40B4-BE49-F238E27FC236}">
+                <a16:creationId xmlns:a16="http://schemas.microsoft.com/office/drawing/2014/main" id="{BAE48C3A-3178-45B0-9209-33AE826503AE}"/>
+              </a:ext>
+            </a:extLst>
+          </p:cNvPr>
+          <p:cNvSpPr txBox="1"/>
+          <p:nvPr/>
+        </p:nvSpPr>
+        <p:spPr>
+          <a:xfrm>
+            <a:off x="4629150" y="1620917"/>
+            <a:ext cx="1304428" cy="923330"/>
+          </a:xfrm>
+          <a:prstGeom prst="rect">
+            <a:avLst/>
+          </a:prstGeom>
+          <a:noFill/>
+        </p:spPr>
+        <p:txBody>
+          <a:bodyPr wrap="square" rtlCol="0">
+            <a:spAutoFit/>
+          </a:bodyPr>
+          <a:lstStyle/>
+          <a:p>
+            <a:pPr algn="r"/>
+            <a:r>
+              <a:rPr lang="da-DK" dirty="0">
+                <a:solidFill>
+                  <a:schemeClr val="tx1">
+                    <a:lumMod val="50000"/>
+                    <a:lumOff val="50000"/>
+                  </a:schemeClr>
+                </a:solidFill>
+                <a:latin typeface="Source Sans Pro" panose="020B0503030403020204" pitchFamily="34" charset="0"/>
+                <a:ea typeface="Source Sans Pro" panose="020B0503030403020204" pitchFamily="34" charset="0"/>
+              </a:rPr>
+              <a:t>AI resident at Google X</a:t>
+            </a:r>
+          </a:p>
+          <a:p>
+            <a:pPr algn="r"/>
+            <a:r>
+              <a:rPr lang="en-US" dirty="0">
+                <a:solidFill>
+                  <a:schemeClr val="tx1">
+                    <a:lumMod val="50000"/>
+                    <a:lumOff val="50000"/>
+                  </a:schemeClr>
+                </a:solidFill>
+                <a:latin typeface="Source Sans Pro" panose="020B0503030403020204" pitchFamily="34" charset="0"/>
+                <a:ea typeface="Source Sans Pro" panose="020B0503030403020204" pitchFamily="34" charset="0"/>
+              </a:rPr>
+              <a:t> </a:t>
+            </a:r>
+          </a:p>
+        </p:txBody>
+      </p:sp>
+    </p:spTree>
+    <p:extLst>
+      <p:ext uri="{BB962C8B-B14F-4D97-AF65-F5344CB8AC3E}">
+        <p14:creationId xmlns:p14="http://schemas.microsoft.com/office/powerpoint/2010/main" val="3554261913"/>
       </p:ext>
     </p:extLst>
   </p:cSld>

</xml_diff>